<commit_message>
imporve stories and other details
</commit_message>
<xml_diff>
--- a/img/blogger.pptx
+++ b/img/blogger.pptx
@@ -259,7 +259,7 @@
           <a:p>
             <a:fld id="{103900F8-3EC2-4C8A-92F9-78FD19991FB5}" type="datetimeFigureOut">
               <a:rPr lang="zh-CN" altLang="en-US" smtClean="0"/>
-              <a:t>2023/12/24</a:t>
+              <a:t>2023/12/28</a:t>
             </a:fld>
             <a:endParaRPr lang="zh-CN" altLang="en-US"/>
           </a:p>
@@ -457,7 +457,7 @@
           <a:p>
             <a:fld id="{103900F8-3EC2-4C8A-92F9-78FD19991FB5}" type="datetimeFigureOut">
               <a:rPr lang="zh-CN" altLang="en-US" smtClean="0"/>
-              <a:t>2023/12/24</a:t>
+              <a:t>2023/12/28</a:t>
             </a:fld>
             <a:endParaRPr lang="zh-CN" altLang="en-US"/>
           </a:p>
@@ -665,7 +665,7 @@
           <a:p>
             <a:fld id="{103900F8-3EC2-4C8A-92F9-78FD19991FB5}" type="datetimeFigureOut">
               <a:rPr lang="zh-CN" altLang="en-US" smtClean="0"/>
-              <a:t>2023/12/24</a:t>
+              <a:t>2023/12/28</a:t>
             </a:fld>
             <a:endParaRPr lang="zh-CN" altLang="en-US"/>
           </a:p>
@@ -863,7 +863,7 @@
           <a:p>
             <a:fld id="{103900F8-3EC2-4C8A-92F9-78FD19991FB5}" type="datetimeFigureOut">
               <a:rPr lang="zh-CN" altLang="en-US" smtClean="0"/>
-              <a:t>2023/12/24</a:t>
+              <a:t>2023/12/28</a:t>
             </a:fld>
             <a:endParaRPr lang="zh-CN" altLang="en-US"/>
           </a:p>
@@ -1138,7 +1138,7 @@
           <a:p>
             <a:fld id="{103900F8-3EC2-4C8A-92F9-78FD19991FB5}" type="datetimeFigureOut">
               <a:rPr lang="zh-CN" altLang="en-US" smtClean="0"/>
-              <a:t>2023/12/24</a:t>
+              <a:t>2023/12/28</a:t>
             </a:fld>
             <a:endParaRPr lang="zh-CN" altLang="en-US"/>
           </a:p>
@@ -1403,7 +1403,7 @@
           <a:p>
             <a:fld id="{103900F8-3EC2-4C8A-92F9-78FD19991FB5}" type="datetimeFigureOut">
               <a:rPr lang="zh-CN" altLang="en-US" smtClean="0"/>
-              <a:t>2023/12/24</a:t>
+              <a:t>2023/12/28</a:t>
             </a:fld>
             <a:endParaRPr lang="zh-CN" altLang="en-US"/>
           </a:p>
@@ -1815,7 +1815,7 @@
           <a:p>
             <a:fld id="{103900F8-3EC2-4C8A-92F9-78FD19991FB5}" type="datetimeFigureOut">
               <a:rPr lang="zh-CN" altLang="en-US" smtClean="0"/>
-              <a:t>2023/12/24</a:t>
+              <a:t>2023/12/28</a:t>
             </a:fld>
             <a:endParaRPr lang="zh-CN" altLang="en-US"/>
           </a:p>
@@ -1956,7 +1956,7 @@
           <a:p>
             <a:fld id="{103900F8-3EC2-4C8A-92F9-78FD19991FB5}" type="datetimeFigureOut">
               <a:rPr lang="zh-CN" altLang="en-US" smtClean="0"/>
-              <a:t>2023/12/24</a:t>
+              <a:t>2023/12/28</a:t>
             </a:fld>
             <a:endParaRPr lang="zh-CN" altLang="en-US"/>
           </a:p>
@@ -2069,7 +2069,7 @@
           <a:p>
             <a:fld id="{103900F8-3EC2-4C8A-92F9-78FD19991FB5}" type="datetimeFigureOut">
               <a:rPr lang="zh-CN" altLang="en-US" smtClean="0"/>
-              <a:t>2023/12/24</a:t>
+              <a:t>2023/12/28</a:t>
             </a:fld>
             <a:endParaRPr lang="zh-CN" altLang="en-US"/>
           </a:p>
@@ -2380,7 +2380,7 @@
           <a:p>
             <a:fld id="{103900F8-3EC2-4C8A-92F9-78FD19991FB5}" type="datetimeFigureOut">
               <a:rPr lang="zh-CN" altLang="en-US" smtClean="0"/>
-              <a:t>2023/12/24</a:t>
+              <a:t>2023/12/28</a:t>
             </a:fld>
             <a:endParaRPr lang="zh-CN" altLang="en-US"/>
           </a:p>
@@ -2668,7 +2668,7 @@
           <a:p>
             <a:fld id="{103900F8-3EC2-4C8A-92F9-78FD19991FB5}" type="datetimeFigureOut">
               <a:rPr lang="zh-CN" altLang="en-US" smtClean="0"/>
-              <a:t>2023/12/24</a:t>
+              <a:t>2023/12/28</a:t>
             </a:fld>
             <a:endParaRPr lang="zh-CN" altLang="en-US"/>
           </a:p>
@@ -2909,7 +2909,7 @@
           <a:p>
             <a:fld id="{103900F8-3EC2-4C8A-92F9-78FD19991FB5}" type="datetimeFigureOut">
               <a:rPr lang="zh-CN" altLang="en-US" smtClean="0"/>
-              <a:t>2023/12/24</a:t>
+              <a:t>2023/12/28</a:t>
             </a:fld>
             <a:endParaRPr lang="zh-CN" altLang="en-US"/>
           </a:p>
@@ -3354,7 +3354,7 @@
         </p:blipFill>
         <p:spPr>
           <a:xfrm>
-            <a:off x="2786882" y="0"/>
+            <a:off x="2814278" y="13269"/>
             <a:ext cx="8885948" cy="6858000"/>
           </a:xfrm>
           <a:prstGeom prst="rect">
@@ -3836,10 +3836,10 @@
         </p:nvGrpSpPr>
         <p:grpSpPr>
           <a:xfrm rot="575630">
-            <a:off x="6939550" y="231393"/>
-            <a:ext cx="1602761" cy="553998"/>
-            <a:chOff x="8720448" y="957935"/>
-            <a:chExt cx="1602761" cy="395284"/>
+            <a:off x="6941757" y="241942"/>
+            <a:ext cx="1602761" cy="506782"/>
+            <a:chOff x="8720448" y="965330"/>
+            <a:chExt cx="1602761" cy="361595"/>
           </a:xfrm>
         </p:grpSpPr>
         <p:pic>
@@ -3892,8 +3892,8 @@
           </p:nvSpPr>
           <p:spPr>
             <a:xfrm rot="21104877">
-              <a:off x="8786108" y="957935"/>
-              <a:ext cx="1478113" cy="395284"/>
+              <a:off x="8786108" y="1067736"/>
+              <a:ext cx="1478113" cy="175682"/>
             </a:xfrm>
             <a:prstGeom prst="rect">
               <a:avLst/>
@@ -3908,8 +3908,13 @@
             <a:p>
               <a:r>
                 <a:rPr lang="zh-CN" altLang="en-US" sz="1000" dirty="0"/>
-                <a:t>其他博主的收入好高啊，我什么时候能达到那样的水平</a:t>
+                <a:t>我的收入好低啊</a:t>
               </a:r>
+              <a:r>
+                <a:rPr lang="en-US" altLang="zh-CN" sz="1000" dirty="0"/>
+                <a:t>……</a:t>
+              </a:r>
+              <a:endParaRPr lang="zh-CN" altLang="en-US" sz="1000" dirty="0"/>
             </a:p>
           </p:txBody>
         </p:sp>
@@ -4000,7 +4005,7 @@
             <a:p>
               <a:r>
                 <a:rPr lang="zh-CN" altLang="en-US" sz="1000" dirty="0"/>
-                <a:t>你的账号怎么不温不火啊，做这么久才这么点流量</a:t>
+                <a:t>你的账号怎么不温不火啊，做这么久才这么点粉丝</a:t>
               </a:r>
             </a:p>
           </p:txBody>
@@ -4076,7 +4081,7 @@
           </p:nvSpPr>
           <p:spPr>
             <a:xfrm rot="21104877">
-              <a:off x="8769389" y="972484"/>
+              <a:off x="8769389" y="972483"/>
               <a:ext cx="1478113" cy="285483"/>
             </a:xfrm>
             <a:prstGeom prst="rect">
@@ -4092,7 +4097,7 @@
             <a:p>
               <a:r>
                 <a:rPr lang="zh-CN" altLang="en-US" sz="1000" dirty="0"/>
-                <a:t>你真的在好好维护你的账号啊？</a:t>
+                <a:t>成天窝在家里不去上班，你真的在好好赚钱吗？</a:t>
               </a:r>
             </a:p>
           </p:txBody>
@@ -4184,7 +4189,7 @@
             <a:p>
               <a:r>
                 <a:rPr lang="zh-CN" altLang="en-US" sz="1000" dirty="0"/>
-                <a:t>我本来就是出于兴趣做的，没流量也没事</a:t>
+                <a:t>我本来就是出于兴趣做的，没人看也没事</a:t>
               </a:r>
             </a:p>
           </p:txBody>
@@ -4828,7 +4833,7 @@
             <a:p>
               <a:r>
                 <a:rPr lang="zh-CN" altLang="en-US" sz="1000" dirty="0"/>
-                <a:t>我会找一些其他工作提高收入</a:t>
+                <a:t>我要找一些其他工作提高收入</a:t>
               </a:r>
             </a:p>
           </p:txBody>
@@ -5181,10 +5186,6 @@
             <a:r>
               <a:rPr lang="zh-CN" altLang="en-US" b="1" dirty="0"/>
               <a:t>痛点：</a:t>
-            </a:r>
-            <a:r>
-              <a:rPr lang="en-US" altLang="zh-CN" dirty="0"/>
-              <a:t>P</a:t>
             </a:r>
             <a:r>
               <a:rPr lang="zh-CN" altLang="en-US" dirty="0"/>

</xml_diff>